<commit_message>
update for Jan 2023
These are quarto files hence the manual upload, I need to upgrade the whole website to Quarto.
</commit_message>
<xml_diff>
--- a/docs/day1.pptx
+++ b/docs/day1.pptx
@@ -24,6 +24,7 @@
     <p:sldId id="283" r:id="rId21"/>
     <p:sldId id="284" r:id="rId22"/>
     <p:sldId id="264" r:id="rId23"/>
+    <p:sldId id="301" r:id="rId24"/>
   </p:sldIdLst>
   <p:sldSz cx="12192000" cy="6858000"/>
   <p:notesSz cx="6858000" cy="9144000"/>
@@ -1107,13 +1108,11 @@
         <a:lstStyle/>
         <a:p>
           <a:r>
-            <a:rPr lang="en-GB" sz="1800" b="1" dirty="0" err="1"/>
-            <a:t>RMarkdown</a:t>
+            <a:rPr lang="en-GB" sz="1800" b="1" dirty="0"/>
+            <a:t>Quarto</a:t>
           </a:r>
-          <a:r>
-            <a:rPr lang="en-GB" sz="1800" b="1" dirty="0"/>
-            <a:t> </a:t>
-          </a:r>
+        </a:p>
+        <a:p>
           <a:r>
             <a:rPr lang="en-GB" sz="1600" dirty="0"/>
             <a:t>reports and presentations</a:t>
@@ -1861,13 +1860,23 @@
             <a:buNone/>
           </a:pPr>
           <a:r>
-            <a:rPr lang="en-GB" sz="1800" b="1" kern="1200" dirty="0" err="1"/>
-            <a:t>RMarkdown</a:t>
+            <a:rPr lang="en-GB" sz="1800" b="1" kern="1200" dirty="0"/>
+            <a:t>Quarto</a:t>
           </a:r>
-          <a:r>
-            <a:rPr lang="en-GB" sz="1800" b="1" kern="1200" dirty="0"/>
-            <a:t> </a:t>
-          </a:r>
+        </a:p>
+        <a:p>
+          <a:pPr marL="0" lvl="0" indent="0" algn="ctr" defTabSz="800100">
+            <a:lnSpc>
+              <a:spcPct val="90000"/>
+            </a:lnSpc>
+            <a:spcBef>
+              <a:spcPct val="0"/>
+            </a:spcBef>
+            <a:spcAft>
+              <a:spcPct val="35000"/>
+            </a:spcAft>
+            <a:buNone/>
+          </a:pPr>
           <a:r>
             <a:rPr lang="en-GB" sz="1600" kern="1200" dirty="0"/>
             <a:t>reports and presentations</a:t>
@@ -4560,7 +4569,7 @@
           <a:p>
             <a:fld id="{3C6EC2BA-6AD1-484E-A8E2-68BB2565F1E0}" type="datetimeFigureOut">
               <a:rPr lang="en-GB" smtClean="0"/>
-              <a:t>26/09/2022</a:t>
+              <a:t>16/01/2023</a:t>
             </a:fld>
             <a:endParaRPr lang="en-GB"/>
           </a:p>
@@ -4768,7 +4777,7 @@
           <a:p>
             <a:fld id="{3C6EC2BA-6AD1-484E-A8E2-68BB2565F1E0}" type="datetimeFigureOut">
               <a:rPr lang="en-GB" smtClean="0"/>
-              <a:t>26/09/2022</a:t>
+              <a:t>16/01/2023</a:t>
             </a:fld>
             <a:endParaRPr lang="en-GB"/>
           </a:p>
@@ -4981,7 +4990,7 @@
           <a:p>
             <a:fld id="{3C6EC2BA-6AD1-484E-A8E2-68BB2565F1E0}" type="datetimeFigureOut">
               <a:rPr lang="en-GB" smtClean="0"/>
-              <a:t>26/09/2022</a:t>
+              <a:t>16/01/2023</a:t>
             </a:fld>
             <a:endParaRPr lang="en-GB"/>
           </a:p>
@@ -5204,7 +5213,7 @@
           <a:p>
             <a:fld id="{3C6EC2BA-6AD1-484E-A8E2-68BB2565F1E0}" type="datetimeFigureOut">
               <a:rPr lang="en-GB" smtClean="0"/>
-              <a:t>26/09/2022</a:t>
+              <a:t>16/01/2023</a:t>
             </a:fld>
             <a:endParaRPr lang="en-GB"/>
           </a:p>
@@ -5483,7 +5492,7 @@
           <a:p>
             <a:fld id="{3C6EC2BA-6AD1-484E-A8E2-68BB2565F1E0}" type="datetimeFigureOut">
               <a:rPr lang="en-GB" smtClean="0"/>
-              <a:t>26/09/2022</a:t>
+              <a:t>16/01/2023</a:t>
             </a:fld>
             <a:endParaRPr lang="en-GB"/>
           </a:p>
@@ -5759,7 +5768,7 @@
           <a:p>
             <a:fld id="{3C6EC2BA-6AD1-484E-A8E2-68BB2565F1E0}" type="datetimeFigureOut">
               <a:rPr lang="en-GB" smtClean="0"/>
-              <a:t>26/09/2022</a:t>
+              <a:t>16/01/2023</a:t>
             </a:fld>
             <a:endParaRPr lang="en-GB"/>
           </a:p>
@@ -6177,7 +6186,7 @@
           <a:p>
             <a:fld id="{3C6EC2BA-6AD1-484E-A8E2-68BB2565F1E0}" type="datetimeFigureOut">
               <a:rPr lang="en-GB" smtClean="0"/>
-              <a:t>26/09/2022</a:t>
+              <a:t>16/01/2023</a:t>
             </a:fld>
             <a:endParaRPr lang="en-GB"/>
           </a:p>
@@ -6327,7 +6336,7 @@
           <a:p>
             <a:fld id="{3C6EC2BA-6AD1-484E-A8E2-68BB2565F1E0}" type="datetimeFigureOut">
               <a:rPr lang="en-GB" smtClean="0"/>
-              <a:t>26/09/2022</a:t>
+              <a:t>16/01/2023</a:t>
             </a:fld>
             <a:endParaRPr lang="en-GB"/>
           </a:p>
@@ -6440,7 +6449,7 @@
           <a:p>
             <a:fld id="{3C6EC2BA-6AD1-484E-A8E2-68BB2565F1E0}" type="datetimeFigureOut">
               <a:rPr lang="en-GB" smtClean="0"/>
-              <a:t>26/09/2022</a:t>
+              <a:t>16/01/2023</a:t>
             </a:fld>
             <a:endParaRPr lang="en-GB"/>
           </a:p>
@@ -6756,7 +6765,7 @@
           <a:p>
             <a:fld id="{3C6EC2BA-6AD1-484E-A8E2-68BB2565F1E0}" type="datetimeFigureOut">
               <a:rPr lang="en-GB" smtClean="0"/>
-              <a:t>26/09/2022</a:t>
+              <a:t>16/01/2023</a:t>
             </a:fld>
             <a:endParaRPr lang="en-GB"/>
           </a:p>
@@ -7048,7 +7057,7 @@
           <a:p>
             <a:fld id="{3C6EC2BA-6AD1-484E-A8E2-68BB2565F1E0}" type="datetimeFigureOut">
               <a:rPr lang="en-GB" smtClean="0"/>
-              <a:t>26/09/2022</a:t>
+              <a:t>16/01/2023</a:t>
             </a:fld>
             <a:endParaRPr lang="en-GB"/>
           </a:p>
@@ -7295,7 +7304,7 @@
           <a:p>
             <a:fld id="{3C6EC2BA-6AD1-484E-A8E2-68BB2565F1E0}" type="datetimeFigureOut">
               <a:rPr lang="en-GB" smtClean="0"/>
-              <a:t>26/09/2022</a:t>
+              <a:t>16/01/2023</a:t>
             </a:fld>
             <a:endParaRPr lang="en-GB"/>
           </a:p>
@@ -7992,12 +8001,12 @@
         <p:spPr>
           <a:xfrm>
             <a:off x="838200" y="1600200"/>
-            <a:ext cx="10515600" cy="4864607"/>
+            <a:ext cx="10515600" cy="5093208"/>
           </a:xfrm>
         </p:spPr>
         <p:txBody>
           <a:bodyPr vert="horz" lIns="91440" tIns="45720" rIns="91440" bIns="45720" rtlCol="0" anchor="t">
-            <a:normAutofit fontScale="62500" lnSpcReduction="20000"/>
+            <a:normAutofit fontScale="70000" lnSpcReduction="20000"/>
           </a:bodyPr>
           <a:lstStyle/>
           <a:p>
@@ -8238,7 +8247,7 @@
         </p:spPr>
         <p:txBody>
           <a:bodyPr>
-            <a:normAutofit fontScale="92500" lnSpcReduction="10000"/>
+            <a:normAutofit/>
           </a:bodyPr>
           <a:lstStyle/>
           <a:p>
@@ -8248,25 +8257,16 @@
             </a:r>
           </a:p>
           <a:p>
-            <a:endParaRPr lang="en-GB" dirty="0"/>
-          </a:p>
-          <a:p>
             <a:r>
               <a:rPr lang="en-GB" dirty="0"/>
               <a:t>(Based on ‘S’ language written in the 70s)</a:t>
             </a:r>
           </a:p>
           <a:p>
-            <a:endParaRPr lang="en-GB" dirty="0"/>
-          </a:p>
-          <a:p>
             <a:r>
               <a:rPr lang="en-GB" dirty="0"/>
               <a:t>Many ways to do the same thing, many abandoned packages.</a:t>
             </a:r>
-          </a:p>
-          <a:p>
-            <a:endParaRPr lang="en-GB" dirty="0"/>
           </a:p>
           <a:p>
             <a:r>
@@ -8295,13 +8295,10 @@
             </a:r>
           </a:p>
           <a:p>
-            <a:endParaRPr lang="en-GB" dirty="0"/>
-          </a:p>
-          <a:p>
-            <a:pPr marL="0" indent="0">
-              <a:buNone/>
-            </a:pPr>
-            <a:endParaRPr lang="en-GB" dirty="0"/>
+            <a:r>
+              <a:rPr lang="en-GB" dirty="0"/>
+              <a:t>Keeping up can be impossible</a:t>
+            </a:r>
           </a:p>
         </p:txBody>
       </p:sp>
@@ -8798,13 +8795,8 @@
           <a:p>
             <a:r>
               <a:rPr lang="en-GB" dirty="0"/>
-              <a:t>Sources of help 2 - </a:t>
-            </a:r>
-            <a:r>
-              <a:rPr lang="en-GB" dirty="0" err="1"/>
-              <a:t>Rstudio</a:t>
-            </a:r>
-            <a:endParaRPr lang="en-GB" dirty="0"/>
+              <a:t>Sources of help 2 – RStudio and packages</a:t>
+            </a:r>
           </a:p>
         </p:txBody>
       </p:sp>
@@ -8829,7 +8821,65 @@
           <a:bodyPr/>
           <a:lstStyle/>
           <a:p>
+            <a:r>
+              <a:rPr lang="en-GB" dirty="0">
+                <a:hlinkClick r:id="rId2"/>
+              </a:rPr>
+              <a:t>https://education.rstudio.com/learn/beginner/</a:t>
+            </a:r>
             <a:endParaRPr lang="en-GB" dirty="0"/>
+          </a:p>
+          <a:p>
+            <a:endParaRPr lang="en-GB" dirty="0"/>
+          </a:p>
+          <a:p>
+            <a:r>
+              <a:rPr lang="en-GB" dirty="0"/>
+              <a:t>Good set of tutorials.</a:t>
+            </a:r>
+          </a:p>
+          <a:p>
+            <a:r>
+              <a:rPr lang="en-GB" dirty="0"/>
+              <a:t>A bit ‘</a:t>
+            </a:r>
+            <a:r>
+              <a:rPr lang="en-GB" dirty="0" err="1"/>
+              <a:t>tidyverse</a:t>
+            </a:r>
+            <a:r>
+              <a:rPr lang="en-GB" dirty="0"/>
+              <a:t>’ oriented as made by the RStudio people!</a:t>
+            </a:r>
+          </a:p>
+          <a:p>
+            <a:endParaRPr lang="en-GB" dirty="0"/>
+          </a:p>
+          <a:p>
+            <a:r>
+              <a:rPr lang="en-GB" dirty="0"/>
+              <a:t>Other websites, </a:t>
+            </a:r>
+            <a:r>
+              <a:rPr lang="en-GB" dirty="0" err="1"/>
+              <a:t>eg</a:t>
+            </a:r>
+            <a:r>
+              <a:rPr lang="en-GB" dirty="0"/>
+              <a:t> for metagenomics:</a:t>
+            </a:r>
+          </a:p>
+          <a:p>
+            <a:r>
+              <a:rPr lang="en-GB" dirty="0">
+                <a:hlinkClick r:id="rId3"/>
+              </a:rPr>
+              <a:t>https://joey711.github.io/phyloseq/</a:t>
+            </a:r>
+            <a:r>
+              <a:rPr lang="en-GB" dirty="0"/>
+              <a:t> </a:t>
+            </a:r>
           </a:p>
         </p:txBody>
       </p:sp>
@@ -9097,16 +9147,6 @@
               <a:t> - Some very good tips for workflow development</a:t>
             </a:r>
           </a:p>
-          <a:p>
-            <a:endParaRPr lang="en-GB" dirty="0">
-              <a:cs typeface="Calibri" panose="020F0502020204030204"/>
-            </a:endParaRPr>
-          </a:p>
-          <a:p>
-            <a:endParaRPr lang="en-GB" dirty="0">
-              <a:cs typeface="Calibri" panose="020F0502020204030204"/>
-            </a:endParaRPr>
-          </a:p>
         </p:txBody>
       </p:sp>
     </p:spTree>
@@ -9399,7 +9439,7 @@
         <p:spPr/>
         <p:txBody>
           <a:bodyPr>
-            <a:normAutofit fontScale="85000" lnSpcReduction="20000"/>
+            <a:normAutofit fontScale="62500" lnSpcReduction="20000"/>
           </a:bodyPr>
           <a:lstStyle/>
           <a:p>
@@ -9446,7 +9486,7 @@
             <a:pPr lvl="1"/>
             <a:r>
               <a:rPr lang="en-GB" dirty="0"/>
-              <a:t>Stackoverflow.com  for high quality R questions and answers</a:t>
+              <a:t>stackoverflow.com  for high quality R questions and answers</a:t>
             </a:r>
           </a:p>
           <a:p>
@@ -9461,13 +9501,26 @@
             </a:r>
           </a:p>
           <a:p>
+            <a:endParaRPr lang="en-GB" dirty="0"/>
+          </a:p>
+          <a:p>
+            <a:r>
+              <a:rPr lang="en-GB" dirty="0"/>
+              <a:t>Google </a:t>
+            </a:r>
+            <a:r>
+              <a:rPr lang="en-GB" i="1" dirty="0"/>
+              <a:t>“how do I …… in R”</a:t>
+            </a:r>
+          </a:p>
+          <a:p>
             <a:pPr lvl="1"/>
             <a:endParaRPr lang="en-GB" dirty="0"/>
           </a:p>
           <a:p>
             <a:r>
               <a:rPr lang="en-GB" dirty="0"/>
-              <a:t>Twitter #rstats  @rstudiotips</a:t>
+              <a:t>Social media #rstats </a:t>
             </a:r>
           </a:p>
           <a:p>
@@ -9540,7 +9593,7 @@
             <p:ph idx="1"/>
             <p:extLst>
               <p:ext uri="{D42A27DB-BD31-4B8C-83A1-F6EECF244321}">
-                <p14:modId xmlns:p14="http://schemas.microsoft.com/office/powerpoint/2010/main" val="2410262497"/>
+                <p14:modId xmlns:p14="http://schemas.microsoft.com/office/powerpoint/2010/main" val="1973947727"/>
               </p:ext>
             </p:extLst>
           </p:nvPr>
@@ -9835,18 +9888,18 @@
         <p:spPr>
           <a:xfrm>
             <a:off x="838200" y="1847088"/>
-            <a:ext cx="10515600" cy="4681728"/>
+            <a:ext cx="7427976" cy="4681728"/>
           </a:xfrm>
         </p:spPr>
         <p:txBody>
           <a:bodyPr vert="horz" lIns="91440" tIns="45720" rIns="91440" bIns="45720" rtlCol="0" anchor="t">
-            <a:normAutofit fontScale="92500" lnSpcReduction="10000"/>
+            <a:normAutofit fontScale="85000" lnSpcReduction="20000"/>
           </a:bodyPr>
           <a:lstStyle/>
           <a:p>
             <a:r>
               <a:rPr lang="en-GB" sz="3200" b="1" dirty="0"/>
-              <a:t>Day  1 (In person, demo plus some hands on) </a:t>
+              <a:t>Day  1 (In person, demo plus some hands on; break 2.30) </a:t>
             </a:r>
           </a:p>
           <a:p>
@@ -9861,22 +9914,18 @@
             </a:r>
             <a:r>
               <a:rPr lang="en-GB" sz="2800" dirty="0"/>
-              <a:t> (1 hour)</a:t>
+              <a:t> </a:t>
             </a:r>
           </a:p>
           <a:p>
             <a:pPr lvl="1"/>
             <a:r>
+              <a:rPr lang="en-GB" sz="2800" dirty="0" err="1"/>
+              <a:t>Tidyverse</a:t>
+            </a:r>
+            <a:r>
               <a:rPr lang="en-GB" sz="2800" dirty="0"/>
-              <a:t>Tidy data / </a:t>
-            </a:r>
-            <a:r>
-              <a:rPr lang="en-GB" sz="2800" dirty="0" err="1"/>
-              <a:t>tidyverse</a:t>
-            </a:r>
-            <a:r>
-              <a:rPr lang="en-GB" sz="2800" dirty="0"/>
-              <a:t> (1 hour)</a:t>
+              <a:t> / Graphics</a:t>
             </a:r>
           </a:p>
           <a:p>
@@ -9887,33 +9936,28 @@
             </a:r>
             <a:r>
               <a:rPr lang="en-GB" sz="2800" dirty="0"/>
-              <a:t> / tests using the formula interface (1 hour)</a:t>
+              <a:t> / linear models (tests)</a:t>
             </a:r>
           </a:p>
           <a:p>
             <a:r>
               <a:rPr lang="en-GB" sz="3200" b="1" dirty="0"/>
-              <a:t>Day 2 (Self-directed learning)</a:t>
+              <a:t>Day 2 (Self-directed learning / with support)</a:t>
             </a:r>
           </a:p>
           <a:p>
             <a:pPr lvl="1"/>
             <a:r>
               <a:rPr lang="en-GB" sz="2800" dirty="0"/>
-              <a:t>Consolidate: do a typical statistical analysis</a:t>
+              <a:t>Finish day 1 work</a:t>
             </a:r>
           </a:p>
           <a:p>
             <a:pPr lvl="1"/>
             <a:r>
               <a:rPr lang="en-GB" sz="2800" dirty="0"/>
-              <a:t>Intro to </a:t>
-            </a:r>
-            <a:r>
-              <a:rPr lang="en-GB" sz="2800" dirty="0" err="1"/>
-              <a:t>ggplot</a:t>
-            </a:r>
-            <a:endParaRPr lang="en-GB" sz="2800" dirty="0"/>
+              <a:t>Real data / cleaning and coding</a:t>
+            </a:r>
           </a:p>
           <a:p>
             <a:r>
@@ -9925,14 +9969,14 @@
             <a:pPr lvl="1"/>
             <a:r>
               <a:rPr lang="en-GB" sz="2800" dirty="0"/>
-              <a:t>Modelling</a:t>
+              <a:t>Modelling (fitting models, transformations, diagnostics, assumptions etc)</a:t>
             </a:r>
           </a:p>
           <a:p>
             <a:pPr lvl="1"/>
             <a:r>
               <a:rPr lang="en-GB" sz="2800" dirty="0"/>
-              <a:t>(fitting models, transformations, diagnostics, assumptions etc)</a:t>
+              <a:t>More graphics</a:t>
             </a:r>
           </a:p>
           <a:p>
@@ -9948,6 +9992,125 @@
     <p:extLst>
       <p:ext uri="{BB962C8B-B14F-4D97-AF65-F5344CB8AC3E}">
         <p14:creationId xmlns:p14="http://schemas.microsoft.com/office/powerpoint/2010/main" val="3749851234"/>
+      </p:ext>
+    </p:extLst>
+  </p:cSld>
+  <p:clrMapOvr>
+    <a:masterClrMapping/>
+  </p:clrMapOvr>
+</p:sld>
+</file>
+
+<file path=ppt/slides/slide20.xml><?xml version="1.0" encoding="utf-8"?>
+<p:sld xmlns:a="http://schemas.openxmlformats.org/drawingml/2006/main" xmlns:r="http://schemas.openxmlformats.org/officeDocument/2006/relationships" xmlns:p="http://schemas.openxmlformats.org/presentationml/2006/main">
+  <p:cSld>
+    <p:spTree>
+      <p:nvGrpSpPr>
+        <p:cNvPr id="1" name=""/>
+        <p:cNvGrpSpPr/>
+        <p:nvPr/>
+      </p:nvGrpSpPr>
+      <p:grpSpPr>
+        <a:xfrm>
+          <a:off x="0" y="0"/>
+          <a:ext cx="0" cy="0"/>
+          <a:chOff x="0" y="0"/>
+          <a:chExt cx="0" cy="0"/>
+        </a:xfrm>
+      </p:grpSpPr>
+      <p:sp>
+        <p:nvSpPr>
+          <p:cNvPr id="2" name="Title 1">
+            <a:extLst>
+              <a:ext uri="{FF2B5EF4-FFF2-40B4-BE49-F238E27FC236}">
+                <a16:creationId xmlns:a16="http://schemas.microsoft.com/office/drawing/2014/main" id="{CD0FE216-2D16-05CD-2481-E756BA3E2080}"/>
+              </a:ext>
+            </a:extLst>
+          </p:cNvPr>
+          <p:cNvSpPr>
+            <a:spLocks noGrp="1"/>
+          </p:cNvSpPr>
+          <p:nvPr>
+            <p:ph type="title"/>
+          </p:nvPr>
+        </p:nvSpPr>
+        <p:spPr/>
+        <p:txBody>
+          <a:bodyPr/>
+          <a:lstStyle/>
+          <a:p>
+            <a:r>
+              <a:rPr lang="en-GB" dirty="0"/>
+              <a:t>Start RStudio!</a:t>
+            </a:r>
+          </a:p>
+        </p:txBody>
+      </p:sp>
+      <p:sp>
+        <p:nvSpPr>
+          <p:cNvPr id="3" name="Content Placeholder 2">
+            <a:extLst>
+              <a:ext uri="{FF2B5EF4-FFF2-40B4-BE49-F238E27FC236}">
+                <a16:creationId xmlns:a16="http://schemas.microsoft.com/office/drawing/2014/main" id="{2DDD79E9-AD4F-1BAE-157D-EFECF831E854}"/>
+              </a:ext>
+            </a:extLst>
+          </p:cNvPr>
+          <p:cNvSpPr>
+            <a:spLocks noGrp="1"/>
+          </p:cNvSpPr>
+          <p:nvPr>
+            <p:ph idx="1"/>
+          </p:nvPr>
+        </p:nvSpPr>
+        <p:spPr/>
+        <p:txBody>
+          <a:bodyPr/>
+          <a:lstStyle/>
+          <a:p>
+            <a:r>
+              <a:rPr lang="en-GB" dirty="0"/>
+              <a:t>I’ll walk you through:</a:t>
+            </a:r>
+          </a:p>
+          <a:p>
+            <a:endParaRPr lang="en-GB" dirty="0"/>
+          </a:p>
+          <a:p>
+            <a:pPr lvl="1"/>
+            <a:r>
+              <a:rPr lang="en-GB" dirty="0"/>
+              <a:t>Making a new project</a:t>
+            </a:r>
+          </a:p>
+          <a:p>
+            <a:pPr lvl="1"/>
+            <a:r>
+              <a:rPr lang="en-GB" dirty="0"/>
+              <a:t>An R script</a:t>
+            </a:r>
+          </a:p>
+          <a:p>
+            <a:pPr lvl="1"/>
+            <a:r>
+              <a:rPr lang="en-GB" dirty="0"/>
+              <a:t>A Quarto report file</a:t>
+            </a:r>
+          </a:p>
+          <a:p>
+            <a:endParaRPr lang="en-GB" dirty="0"/>
+          </a:p>
+          <a:p>
+            <a:r>
+              <a:rPr lang="en-GB" dirty="0"/>
+              <a:t>Then use the worksheet, and we’ll stop to revise after a break</a:t>
+            </a:r>
+          </a:p>
+        </p:txBody>
+      </p:sp>
+    </p:spTree>
+    <p:extLst>
+      <p:ext uri="{BB962C8B-B14F-4D97-AF65-F5344CB8AC3E}">
+        <p14:creationId xmlns:p14="http://schemas.microsoft.com/office/powerpoint/2010/main" val="3150810242"/>
       </p:ext>
     </p:extLst>
   </p:cSld>
@@ -10045,7 +10208,7 @@
           <a:p>
             <a:r>
               <a:rPr lang="en-GB" dirty="0"/>
-              <a:t>Walk through typical analysis workflow</a:t>
+              <a:t>Loading data / describing / hypothesis tests / graphics</a:t>
             </a:r>
           </a:p>
           <a:p>
@@ -10430,8 +10593,8 @@
         </p:nvSpPr>
         <p:spPr>
           <a:xfrm>
-            <a:off x="1152525" y="2019299"/>
-            <a:ext cx="6057900" cy="4492625"/>
+            <a:off x="1152524" y="2019299"/>
+            <a:ext cx="6409563" cy="4492625"/>
           </a:xfrm>
           <a:noFill/>
           <a:ln>
@@ -10716,7 +10879,7 @@
         <p:spPr/>
         <p:txBody>
           <a:bodyPr>
-            <a:normAutofit/>
+            <a:normAutofit lnSpcReduction="10000"/>
           </a:bodyPr>
           <a:lstStyle/>
           <a:p>
@@ -10795,7 +10958,7 @@
             </a:r>
             <a:r>
               <a:rPr lang="en-GB" dirty="0"/>
-              <a:t> ‘1’ indexed!) – spend some time learning it.</a:t>
+              <a:t> vectorised function, ‘1’ indexed!) – spend some time learning it.</a:t>
             </a:r>
           </a:p>
         </p:txBody>
@@ -11126,7 +11289,7 @@
             <a:pPr algn="ctr"/>
             <a:r>
               <a:rPr lang="en-GB" dirty="0"/>
-              <a:t>Report! (pdf, docx, html)</a:t>
+              <a:t>Report (pdf, docx, html)</a:t>
             </a:r>
           </a:p>
         </p:txBody>
@@ -11755,21 +11918,6 @@
 </file>
 
 <file path=customXml/item1.xml><?xml version="1.0" encoding="utf-8"?>
-<p:properties xmlns:p="http://schemas.microsoft.com/office/2006/metadata/properties" xmlns:xsi="http://www.w3.org/2001/XMLSchema-instance" xmlns:pc="http://schemas.microsoft.com/office/infopath/2007/PartnerControls">
-  <documentManagement/>
-</p:properties>
-</file>
-
-<file path=customXml/item2.xml><?xml version="1.0" encoding="utf-8"?>
-<?mso-contentType ?>
-<FormTemplates xmlns="http://schemas.microsoft.com/sharepoint/v3/contenttype/forms">
-  <Display>DocumentLibraryForm</Display>
-  <Edit>DocumentLibraryForm</Edit>
-  <New>DocumentLibraryForm</New>
-</FormTemplates>
-</file>
-
-<file path=customXml/item3.xml><?xml version="1.0" encoding="utf-8"?>
 <ct:contentTypeSchema xmlns:ct="http://schemas.microsoft.com/office/2006/metadata/contentType" xmlns:ma="http://schemas.microsoft.com/office/2006/metadata/properties/metaAttributes" ct:_="" ma:_="" ma:contentTypeName="Document" ma:contentTypeID="0x0101005627BA6AF434694A8B630154A0EB1116" ma:contentTypeVersion="0" ma:contentTypeDescription="Create a new document." ma:contentTypeScope="" ma:versionID="e67d92fcbbc04feaef8a1d9b71615711">
   <xsd:schema xmlns:xsd="http://www.w3.org/2001/XMLSchema" xmlns:xs="http://www.w3.org/2001/XMLSchema" xmlns:p="http://schemas.microsoft.com/office/2006/metadata/properties" targetNamespace="http://schemas.microsoft.com/office/2006/metadata/properties" ma:root="true" ma:fieldsID="0967b7be50301903c78f9c39c6fd9af8">
     <xsd:element name="properties">
@@ -11883,10 +12031,32 @@
 </ct:contentTypeSchema>
 </file>
 
+<file path=customXml/item2.xml><?xml version="1.0" encoding="utf-8"?>
+<?mso-contentType ?>
+<FormTemplates xmlns="http://schemas.microsoft.com/sharepoint/v3/contenttype/forms">
+  <Display>DocumentLibraryForm</Display>
+  <Edit>DocumentLibraryForm</Edit>
+  <New>DocumentLibraryForm</New>
+</FormTemplates>
+</file>
+
+<file path=customXml/item3.xml><?xml version="1.0" encoding="utf-8"?>
+<p:properties xmlns:p="http://schemas.microsoft.com/office/2006/metadata/properties" xmlns:xsi="http://www.w3.org/2001/XMLSchema-instance" xmlns:pc="http://schemas.microsoft.com/office/infopath/2007/PartnerControls">
+  <documentManagement/>
+</p:properties>
+</file>
+
 <file path=customXml/itemProps1.xml><?xml version="1.0" encoding="utf-8"?>
-<ds:datastoreItem xmlns:ds="http://schemas.openxmlformats.org/officeDocument/2006/customXml" ds:itemID="{6251E95B-2ACF-4DAC-8417-6A5A7C08B249}">
+<ds:datastoreItem xmlns:ds="http://schemas.openxmlformats.org/officeDocument/2006/customXml" ds:itemID="{E33AB220-0749-48BF-8A38-C70856B09281}">
   <ds:schemaRefs>
+    <ds:schemaRef ds:uri="http://schemas.microsoft.com/office/2006/metadata/contentType"/>
+    <ds:schemaRef ds:uri="http://schemas.microsoft.com/office/2006/metadata/properties/metaAttributes"/>
+    <ds:schemaRef ds:uri="http://www.w3.org/2001/XMLSchema"/>
     <ds:schemaRef ds:uri="http://schemas.microsoft.com/office/2006/metadata/properties"/>
+    <ds:schemaRef ds:uri="http://schemas.openxmlformats.org/package/2006/metadata/core-properties"/>
+    <ds:schemaRef ds:uri="http://purl.org/dc/elements/1.1/"/>
+    <ds:schemaRef ds:uri="http://purl.org/dc/terms/"/>
+    <ds:schemaRef ds:uri="http://schemas.microsoft.com/internal/obd"/>
     <ds:schemaRef ds:uri="http://schemas.microsoft.com/office/infopath/2007/PartnerControls"/>
   </ds:schemaRefs>
 </ds:datastoreItem>
@@ -11901,16 +12071,9 @@
 </file>
 
 <file path=customXml/itemProps3.xml><?xml version="1.0" encoding="utf-8"?>
-<ds:datastoreItem xmlns:ds="http://schemas.openxmlformats.org/officeDocument/2006/customXml" ds:itemID="{E33AB220-0749-48BF-8A38-C70856B09281}">
+<ds:datastoreItem xmlns:ds="http://schemas.openxmlformats.org/officeDocument/2006/customXml" ds:itemID="{6251E95B-2ACF-4DAC-8417-6A5A7C08B249}">
   <ds:schemaRefs>
-    <ds:schemaRef ds:uri="http://schemas.microsoft.com/office/2006/metadata/contentType"/>
-    <ds:schemaRef ds:uri="http://schemas.microsoft.com/office/2006/metadata/properties/metaAttributes"/>
-    <ds:schemaRef ds:uri="http://www.w3.org/2001/XMLSchema"/>
     <ds:schemaRef ds:uri="http://schemas.microsoft.com/office/2006/metadata/properties"/>
-    <ds:schemaRef ds:uri="http://schemas.openxmlformats.org/package/2006/metadata/core-properties"/>
-    <ds:schemaRef ds:uri="http://purl.org/dc/elements/1.1/"/>
-    <ds:schemaRef ds:uri="http://purl.org/dc/terms/"/>
-    <ds:schemaRef ds:uri="http://schemas.microsoft.com/internal/obd"/>
     <ds:schemaRef ds:uri="http://schemas.microsoft.com/office/infopath/2007/PartnerControls"/>
   </ds:schemaRefs>
 </ds:datastoreItem>

</xml_diff>